<commit_message>
Clean code, chỉnh sửa lại file DoAnCK_NMKHDL
</commit_message>
<xml_diff>
--- a/Slide_DoAnCuoiKy_NMKHDL.pptx
+++ b/Slide_DoAnCuoiKy_NMKHDL.pptx
@@ -5,7 +5,7 @@
     <p:sldMasterId id="2147483661" r:id="rId1"/>
   </p:sldMasterIdLst>
   <p:notesMasterIdLst>
-    <p:notesMasterId r:id="rId29"/>
+    <p:notesMasterId r:id="rId30"/>
   </p:notesMasterIdLst>
   <p:sldIdLst>
     <p:sldId id="256" r:id="rId2"/>
@@ -28,32 +28,33 @@
     <p:sldId id="297" r:id="rId19"/>
     <p:sldId id="308" r:id="rId20"/>
     <p:sldId id="298" r:id="rId21"/>
-    <p:sldId id="299" r:id="rId22"/>
-    <p:sldId id="309" r:id="rId23"/>
-    <p:sldId id="303" r:id="rId24"/>
-    <p:sldId id="304" r:id="rId25"/>
-    <p:sldId id="300" r:id="rId26"/>
-    <p:sldId id="305" r:id="rId27"/>
-    <p:sldId id="279" r:id="rId28"/>
+    <p:sldId id="310" r:id="rId22"/>
+    <p:sldId id="299" r:id="rId23"/>
+    <p:sldId id="309" r:id="rId24"/>
+    <p:sldId id="303" r:id="rId25"/>
+    <p:sldId id="304" r:id="rId26"/>
+    <p:sldId id="300" r:id="rId27"/>
+    <p:sldId id="305" r:id="rId28"/>
+    <p:sldId id="279" r:id="rId29"/>
   </p:sldIdLst>
   <p:sldSz cx="9144000" cy="5143500" type="screen16x9"/>
   <p:notesSz cx="6858000" cy="9144000"/>
   <p:embeddedFontLst>
     <p:embeddedFont>
       <p:font typeface="Cambria Math" panose="02040503050406030204" pitchFamily="18" charset="0"/>
-      <p:regular r:id="rId30"/>
+      <p:regular r:id="rId31"/>
     </p:embeddedFont>
     <p:embeddedFont>
       <p:font typeface="Lato Light" panose="020B0604020202020204" charset="0"/>
-      <p:regular r:id="rId31"/>
-      <p:bold r:id="rId32"/>
-      <p:italic r:id="rId33"/>
-      <p:boldItalic r:id="rId34"/>
+      <p:regular r:id="rId32"/>
+      <p:bold r:id="rId33"/>
+      <p:italic r:id="rId34"/>
+      <p:boldItalic r:id="rId35"/>
     </p:embeddedFont>
     <p:embeddedFont>
       <p:font typeface="Roboto Slab Regular" panose="020B0604020202020204" charset="0"/>
-      <p:regular r:id="rId35"/>
-      <p:bold r:id="rId36"/>
+      <p:regular r:id="rId36"/>
+      <p:bold r:id="rId37"/>
     </p:embeddedFont>
   </p:embeddedFontLst>
   <p:defaultTextStyle>
@@ -312,8 +313,8 @@
         <c:manualLayout>
           <c:xMode val="edge"/>
           <c:yMode val="edge"/>
-          <c:x val="0.34280725065616802"/>
-          <c:y val="1.8749999999999999E-2"/>
+          <c:x val="0.43864058398950129"/>
+          <c:y val="1.2500000000000001E-2"/>
         </c:manualLayout>
       </c:layout>
       <c:overlay val="0"/>
@@ -529,6 +530,39 @@
             </c:extLst>
           </c:dPt>
           <c:dLbls>
+            <c:dLbl>
+              <c:idx val="7"/>
+              <c:tx>
+                <c:rich>
+                  <a:bodyPr/>
+                  <a:lstStyle/>
+                  <a:p>
+                    <a:fld id="{3CC10800-C0B5-4C9B-AA00-EC1471C0A79C}" type="VALUE">
+                      <a:rPr lang="en-US" smtClean="0"/>
+                      <a:pPr/>
+                      <a:t>[GIÁ TRỊ]</a:t>
+                    </a:fld>
+                    <a:endParaRPr lang="en-SG"/>
+                  </a:p>
+                </c:rich>
+              </c:tx>
+              <c:dLblPos val="outEnd"/>
+              <c:showLegendKey val="0"/>
+              <c:showVal val="1"/>
+              <c:showCatName val="0"/>
+              <c:showSerName val="0"/>
+              <c:showPercent val="0"/>
+              <c:showBubbleSize val="0"/>
+              <c:extLst>
+                <c:ext xmlns:c15="http://schemas.microsoft.com/office/drawing/2012/chart" uri="{CE6537A1-D6FC-4f65-9D91-7224C49458BB}">
+                  <c15:dlblFieldTable/>
+                  <c15:showDataLabelsRange val="0"/>
+                </c:ext>
+                <c:ext xmlns:c16="http://schemas.microsoft.com/office/drawing/2014/chart" uri="{C3380CC4-5D6E-409C-BE32-E72D297353CC}">
+                  <c16:uniqueId val="{0000000F-2A00-4CA4-B103-46C90CED3178}"/>
+                </c:ext>
+              </c:extLst>
+            </c:dLbl>
             <c:spPr>
               <a:noFill/>
               <a:ln>
@@ -623,28 +657,28 @@
                 <c:formatCode>General</c:formatCode>
                 <c:ptCount val="8"/>
                 <c:pt idx="0">
-                  <c:v>11.88049</c:v>
+                  <c:v>12.076703</c:v>
                 </c:pt>
                 <c:pt idx="1">
-                  <c:v>12.588513000000001</c:v>
+                  <c:v>12.647899000000001</c:v>
                 </c:pt>
                 <c:pt idx="2">
-                  <c:v>12.824548</c:v>
+                  <c:v>12.607099</c:v>
                 </c:pt>
                 <c:pt idx="3">
-                  <c:v>12.588513000000001</c:v>
+                  <c:v>12.443899999999999</c:v>
                 </c:pt>
                 <c:pt idx="4">
-                  <c:v>12.903226</c:v>
+                  <c:v>12.811097999999999</c:v>
                 </c:pt>
                 <c:pt idx="5">
-                  <c:v>11.880409</c:v>
+                  <c:v>12.076703</c:v>
                 </c:pt>
                 <c:pt idx="6">
-                  <c:v>13.13926</c:v>
+                  <c:v>12.892697</c:v>
                 </c:pt>
                 <c:pt idx="7">
-                  <c:v>12.195122</c:v>
+                  <c:v>12.443899999999999</c:v>
                 </c:pt>
               </c:numCache>
             </c:numRef>
@@ -675,7 +709,7 @@
       </c:spPr>
     </c:plotArea>
     <c:legend>
-      <c:legendPos val="r"/>
+      <c:legendPos val="b"/>
       <c:overlay val="0"/>
       <c:spPr>
         <a:noFill/>
@@ -35363,7 +35397,7 @@
           <p:nvPr>
             <p:extLst>
               <p:ext uri="{D42A27DB-BD31-4B8C-83A1-F6EECF244321}">
-                <p14:modId xmlns:p14="http://schemas.microsoft.com/office/powerpoint/2010/main" val="3638534297"/>
+                <p14:modId xmlns:p14="http://schemas.microsoft.com/office/powerpoint/2010/main" val="1584620273"/>
               </p:ext>
             </p:extLst>
           </p:nvPr>
@@ -35392,7 +35426,7 @@
         </p:nvSpPr>
         <p:spPr>
           <a:xfrm>
-            <a:off x="2286075" y="1874675"/>
+            <a:off x="2834415" y="1634197"/>
             <a:ext cx="5187208" cy="1631732"/>
           </a:xfrm>
           <a:prstGeom prst="star16">
@@ -38003,8 +38037,8 @@
           </a:p>
         </p:txBody>
       </p:sp>
-      <mc:AlternateContent xmlns:mc="http://schemas.openxmlformats.org/markup-compatibility/2006">
-        <mc:Choice xmlns:a14="http://schemas.microsoft.com/office/drawing/2010/main" Requires="a14">
+      <mc:AlternateContent xmlns:mc="http://schemas.openxmlformats.org/markup-compatibility/2006" xmlns:a14="http://schemas.microsoft.com/office/drawing/2010/main">
+        <mc:Choice Requires="a14">
           <p:sp>
             <p:nvSpPr>
               <p:cNvPr id="3" name="Chỗ dành sẵn cho Văn bản 2">
@@ -38951,7 +38985,7 @@
             </p:txBody>
           </p:sp>
         </mc:Choice>
-        <mc:Fallback>
+        <mc:Fallback xmlns="">
           <p:sp>
             <p:nvSpPr>
               <p:cNvPr id="3" name="Chỗ dành sẵn cho Văn bản 2">
@@ -39749,8 +39783,8 @@
           </a:p>
         </p:txBody>
       </p:sp>
-      <mc:AlternateContent xmlns:mc="http://schemas.openxmlformats.org/markup-compatibility/2006">
-        <mc:Choice xmlns:a14="http://schemas.microsoft.com/office/drawing/2010/main" Requires="a14">
+      <mc:AlternateContent xmlns:mc="http://schemas.openxmlformats.org/markup-compatibility/2006" xmlns:a14="http://schemas.microsoft.com/office/drawing/2010/main">
+        <mc:Choice Requires="a14">
           <p:sp>
             <p:nvSpPr>
               <p:cNvPr id="3" name="Chỗ dành sẵn cho Văn bản 2">
@@ -40360,7 +40394,7 @@
             </p:txBody>
           </p:sp>
         </mc:Choice>
-        <mc:Fallback>
+        <mc:Fallback xmlns="">
           <p:sp>
             <p:nvSpPr>
               <p:cNvPr id="3" name="Chỗ dành sẵn cho Văn bản 2">
@@ -41002,7 +41036,7 @@
             </a:r>
             <a:r>
               <a:rPr lang="en-US" dirty="0" err="1"/>
-              <a:t>nhiều</a:t>
+              <a:t>ít</a:t>
             </a:r>
             <a:r>
               <a:rPr lang="en-US" dirty="0"/>
@@ -43928,6 +43962,663 @@
           <p:cNvPr id="2" name="Tiêu đề 1">
             <a:extLst>
               <a:ext uri="{FF2B5EF4-FFF2-40B4-BE49-F238E27FC236}">
+                <a16:creationId xmlns:a16="http://schemas.microsoft.com/office/drawing/2014/main" id="{35031132-064F-4D52-A28F-16B28FBFEDAA}"/>
+              </a:ext>
+            </a:extLst>
+          </p:cNvPr>
+          <p:cNvSpPr>
+            <a:spLocks noGrp="1"/>
+          </p:cNvSpPr>
+          <p:nvPr>
+            <p:ph type="title"/>
+          </p:nvPr>
+        </p:nvSpPr>
+        <p:spPr>
+          <a:xfrm>
+            <a:off x="322668" y="536282"/>
+            <a:ext cx="2142000" cy="2630400"/>
+          </a:xfrm>
+        </p:spPr>
+        <p:txBody>
+          <a:bodyPr/>
+          <a:lstStyle/>
+          <a:p>
+            <a:r>
+              <a:rPr lang="en-US" sz="2800" b="1" dirty="0" err="1"/>
+              <a:t>Độ</a:t>
+            </a:r>
+            <a:r>
+              <a:rPr lang="en-US" sz="2800" b="1" dirty="0"/>
+              <a:t> </a:t>
+            </a:r>
+            <a:r>
+              <a:rPr lang="en-US" sz="2800" b="1" dirty="0" err="1"/>
+              <a:t>lỗi</a:t>
+            </a:r>
+            <a:r>
+              <a:rPr lang="en-US" sz="2800" b="1" dirty="0"/>
+              <a:t> </a:t>
+            </a:r>
+            <a:br>
+              <a:rPr lang="en-US" sz="2800" b="1" dirty="0"/>
+            </a:br>
+            <a:r>
+              <a:rPr lang="en-US" sz="2800" b="1" dirty="0" err="1"/>
+              <a:t>mô</a:t>
+            </a:r>
+            <a:r>
+              <a:rPr lang="en-US" sz="2800" b="1" dirty="0"/>
+              <a:t> </a:t>
+            </a:r>
+            <a:r>
+              <a:rPr lang="en-US" sz="2800" b="1" dirty="0" err="1"/>
+              <a:t>hình</a:t>
+            </a:r>
+            <a:endParaRPr lang="en-SG" sz="2800" b="1" dirty="0"/>
+          </a:p>
+        </p:txBody>
+      </p:sp>
+      <p:sp>
+        <p:nvSpPr>
+          <p:cNvPr id="3" name="Chỗ dành sẵn cho Văn bản 2">
+            <a:extLst>
+              <a:ext uri="{FF2B5EF4-FFF2-40B4-BE49-F238E27FC236}">
+                <a16:creationId xmlns:a16="http://schemas.microsoft.com/office/drawing/2014/main" id="{DB5F10F1-CB0D-445C-B878-25B399905939}"/>
+              </a:ext>
+            </a:extLst>
+          </p:cNvPr>
+          <p:cNvSpPr>
+            <a:spLocks noGrp="1"/>
+          </p:cNvSpPr>
+          <p:nvPr>
+            <p:ph type="body" idx="1"/>
+          </p:nvPr>
+        </p:nvSpPr>
+        <p:spPr>
+          <a:xfrm>
+            <a:off x="2825684" y="576110"/>
+            <a:ext cx="5292300" cy="3779074"/>
+          </a:xfrm>
+        </p:spPr>
+        <p:txBody>
+          <a:bodyPr/>
+          <a:lstStyle/>
+          <a:p>
+            <a:r>
+              <a:rPr lang="en-US" dirty="0" err="1"/>
+              <a:t>Độ</a:t>
+            </a:r>
+            <a:r>
+              <a:rPr lang="en-US" dirty="0"/>
+              <a:t> </a:t>
+            </a:r>
+            <a:r>
+              <a:rPr lang="en-US" dirty="0" err="1"/>
+              <a:t>lỗi</a:t>
+            </a:r>
+            <a:r>
+              <a:rPr lang="en-US" dirty="0"/>
+              <a:t> </a:t>
+            </a:r>
+            <a:r>
+              <a:rPr lang="en-US" dirty="0" err="1"/>
+              <a:t>trên</a:t>
+            </a:r>
+            <a:r>
+              <a:rPr lang="en-US" dirty="0"/>
+              <a:t> </a:t>
+            </a:r>
+            <a:r>
+              <a:rPr lang="en-US" dirty="0" err="1"/>
+              <a:t>tập</a:t>
+            </a:r>
+            <a:r>
+              <a:rPr lang="en-US" dirty="0"/>
+              <a:t> train </a:t>
+            </a:r>
+            <a:r>
+              <a:rPr lang="en-US" dirty="0" err="1"/>
+              <a:t>là</a:t>
+            </a:r>
+            <a:r>
+              <a:rPr lang="en-US" dirty="0"/>
+              <a:t>: 99,52%</a:t>
+            </a:r>
+          </a:p>
+          <a:p>
+            <a:r>
+              <a:rPr lang="en-US" dirty="0" err="1"/>
+              <a:t>Độ</a:t>
+            </a:r>
+            <a:r>
+              <a:rPr lang="en-US" dirty="0"/>
+              <a:t> </a:t>
+            </a:r>
+            <a:r>
+              <a:rPr lang="en-US" dirty="0" err="1"/>
+              <a:t>lỗi</a:t>
+            </a:r>
+            <a:r>
+              <a:rPr lang="en-US" dirty="0"/>
+              <a:t> </a:t>
+            </a:r>
+            <a:r>
+              <a:rPr lang="en-US" dirty="0" err="1"/>
+              <a:t>trên</a:t>
+            </a:r>
+            <a:r>
+              <a:rPr lang="en-US" dirty="0"/>
+              <a:t> </a:t>
+            </a:r>
+            <a:r>
+              <a:rPr lang="en-US" dirty="0" err="1"/>
+              <a:t>tập</a:t>
+            </a:r>
+            <a:r>
+              <a:rPr lang="en-US" dirty="0"/>
+              <a:t> validation </a:t>
+            </a:r>
+            <a:r>
+              <a:rPr lang="en-US" dirty="0" err="1"/>
+              <a:t>là</a:t>
+            </a:r>
+            <a:r>
+              <a:rPr lang="en-US" dirty="0"/>
+              <a:t>: 92.1%</a:t>
+            </a:r>
+          </a:p>
+          <a:p>
+            <a:r>
+              <a:rPr lang="en-US" dirty="0" err="1"/>
+              <a:t>Độ</a:t>
+            </a:r>
+            <a:r>
+              <a:rPr lang="en-US" dirty="0"/>
+              <a:t> </a:t>
+            </a:r>
+            <a:r>
+              <a:rPr lang="en-US" dirty="0" err="1"/>
+              <a:t>lỗi</a:t>
+            </a:r>
+            <a:r>
+              <a:rPr lang="en-US" dirty="0"/>
+              <a:t> </a:t>
+            </a:r>
+            <a:r>
+              <a:rPr lang="en-US" dirty="0" err="1"/>
+              <a:t>trên</a:t>
+            </a:r>
+            <a:r>
+              <a:rPr lang="en-US" dirty="0"/>
+              <a:t> </a:t>
+            </a:r>
+            <a:r>
+              <a:rPr lang="en-US" dirty="0" err="1"/>
+              <a:t>tập</a:t>
+            </a:r>
+            <a:r>
+              <a:rPr lang="en-US" dirty="0"/>
+              <a:t> test </a:t>
+            </a:r>
+            <a:r>
+              <a:rPr lang="en-US" dirty="0" err="1"/>
+              <a:t>là</a:t>
+            </a:r>
+            <a:r>
+              <a:rPr lang="en-US" dirty="0"/>
+              <a:t>: 79,45%</a:t>
+            </a:r>
+          </a:p>
+          <a:p>
+            <a:pPr marL="101600" indent="0">
+              <a:buNone/>
+            </a:pPr>
+            <a:r>
+              <a:rPr lang="en-US" dirty="0"/>
+              <a:t>=&gt; </a:t>
+            </a:r>
+            <a:r>
+              <a:rPr lang="en-US" dirty="0" err="1"/>
+              <a:t>Nhận</a:t>
+            </a:r>
+            <a:r>
+              <a:rPr lang="en-US" dirty="0"/>
+              <a:t> </a:t>
+            </a:r>
+            <a:r>
+              <a:rPr lang="en-US" dirty="0" err="1"/>
+              <a:t>xét</a:t>
+            </a:r>
+            <a:r>
+              <a:rPr lang="en-US" dirty="0"/>
+              <a:t>:</a:t>
+            </a:r>
+          </a:p>
+          <a:p>
+            <a:pPr>
+              <a:buFont typeface="Courier New" panose="02070309020205020404" pitchFamily="49" charset="0"/>
+              <a:buChar char="o"/>
+            </a:pPr>
+            <a:r>
+              <a:rPr lang="en-US" dirty="0" err="1"/>
+              <a:t>Mô</a:t>
+            </a:r>
+            <a:r>
+              <a:rPr lang="en-US" dirty="0"/>
+              <a:t> </a:t>
+            </a:r>
+            <a:r>
+              <a:rPr lang="en-US" dirty="0" err="1"/>
+              <a:t>hình</a:t>
+            </a:r>
+            <a:r>
+              <a:rPr lang="en-US" dirty="0"/>
+              <a:t> </a:t>
+            </a:r>
+            <a:r>
+              <a:rPr lang="en-US" dirty="0" err="1"/>
+              <a:t>dữ</a:t>
+            </a:r>
+            <a:r>
+              <a:rPr lang="en-US" dirty="0"/>
+              <a:t> </a:t>
+            </a:r>
+            <a:r>
+              <a:rPr lang="en-US" dirty="0" err="1"/>
+              <a:t>đoán</a:t>
+            </a:r>
+            <a:r>
+              <a:rPr lang="en-US" dirty="0"/>
+              <a:t> </a:t>
+            </a:r>
+            <a:r>
+              <a:rPr lang="en-US" dirty="0" err="1"/>
+              <a:t>trên</a:t>
+            </a:r>
+            <a:r>
+              <a:rPr lang="en-US" dirty="0"/>
+              <a:t> </a:t>
+            </a:r>
+            <a:r>
+              <a:rPr lang="en-US" dirty="0" err="1"/>
+              <a:t>tập</a:t>
+            </a:r>
+            <a:r>
+              <a:rPr lang="en-US" dirty="0"/>
+              <a:t> test </a:t>
+            </a:r>
+            <a:r>
+              <a:rPr lang="en-US" dirty="0" err="1"/>
+              <a:t>và</a:t>
+            </a:r>
+            <a:r>
+              <a:rPr lang="en-US" dirty="0"/>
+              <a:t> validation </a:t>
+            </a:r>
+            <a:r>
+              <a:rPr lang="en-US" dirty="0" err="1"/>
+              <a:t>cho</a:t>
+            </a:r>
+            <a:r>
+              <a:rPr lang="en-US" dirty="0"/>
+              <a:t> </a:t>
+            </a:r>
+            <a:r>
+              <a:rPr lang="en-US" dirty="0" err="1"/>
+              <a:t>kết</a:t>
+            </a:r>
+            <a:r>
+              <a:rPr lang="en-US" dirty="0"/>
+              <a:t> </a:t>
+            </a:r>
+            <a:r>
+              <a:rPr lang="en-US" dirty="0" err="1"/>
+              <a:t>quả</a:t>
+            </a:r>
+            <a:r>
+              <a:rPr lang="en-US" dirty="0"/>
+              <a:t> </a:t>
+            </a:r>
+            <a:r>
+              <a:rPr lang="en-US" dirty="0" err="1"/>
+              <a:t>dự</a:t>
+            </a:r>
+            <a:r>
+              <a:rPr lang="en-US" dirty="0"/>
+              <a:t> </a:t>
+            </a:r>
+            <a:r>
+              <a:rPr lang="en-US" dirty="0" err="1"/>
+              <a:t>đoán</a:t>
+            </a:r>
+            <a:r>
+              <a:rPr lang="en-US" dirty="0"/>
+              <a:t> </a:t>
+            </a:r>
+            <a:r>
+              <a:rPr lang="en-US" dirty="0" err="1"/>
+              <a:t>khá</a:t>
+            </a:r>
+            <a:r>
+              <a:rPr lang="en-US" dirty="0"/>
+              <a:t> </a:t>
+            </a:r>
+            <a:r>
+              <a:rPr lang="en-US" dirty="0" err="1"/>
+              <a:t>cao</a:t>
+            </a:r>
+            <a:r>
+              <a:rPr lang="en-US" dirty="0"/>
+              <a:t>.</a:t>
+            </a:r>
+          </a:p>
+          <a:p>
+            <a:pPr>
+              <a:buFont typeface="Courier New" panose="02070309020205020404" pitchFamily="49" charset="0"/>
+              <a:buChar char="o"/>
+            </a:pPr>
+            <a:r>
+              <a:rPr lang="en-US" b="1" dirty="0" err="1"/>
+              <a:t>Nhưng</a:t>
+            </a:r>
+            <a:r>
+              <a:rPr lang="en-US" b="1" dirty="0"/>
+              <a:t> </a:t>
+            </a:r>
+            <a:r>
+              <a:rPr lang="en-US" dirty="0" err="1"/>
+              <a:t>khi</a:t>
+            </a:r>
+            <a:r>
+              <a:rPr lang="en-US" dirty="0"/>
+              <a:t> </a:t>
+            </a:r>
+            <a:r>
+              <a:rPr lang="en-US" dirty="0" err="1"/>
+              <a:t>mang</a:t>
+            </a:r>
+            <a:r>
+              <a:rPr lang="en-US" dirty="0"/>
+              <a:t> </a:t>
+            </a:r>
+            <a:r>
+              <a:rPr lang="en-US" dirty="0" err="1"/>
+              <a:t>mô</a:t>
+            </a:r>
+            <a:r>
+              <a:rPr lang="en-US" dirty="0"/>
+              <a:t> </a:t>
+            </a:r>
+            <a:r>
+              <a:rPr lang="en-US" dirty="0" err="1"/>
+              <a:t>hình</a:t>
+            </a:r>
+            <a:r>
+              <a:rPr lang="en-US" dirty="0"/>
+              <a:t> ra </a:t>
+            </a:r>
+            <a:r>
+              <a:rPr lang="en-US" dirty="0" err="1"/>
+              <a:t>để</a:t>
+            </a:r>
+            <a:r>
+              <a:rPr lang="en-US" dirty="0"/>
+              <a:t> </a:t>
+            </a:r>
+            <a:r>
+              <a:rPr lang="en-US" dirty="0" err="1"/>
+              <a:t>dự</a:t>
+            </a:r>
+            <a:r>
+              <a:rPr lang="en-US" dirty="0"/>
+              <a:t> </a:t>
+            </a:r>
+            <a:r>
+              <a:rPr lang="en-US" dirty="0" err="1"/>
+              <a:t>đoán</a:t>
+            </a:r>
+            <a:r>
+              <a:rPr lang="en-US" dirty="0"/>
+              <a:t> </a:t>
+            </a:r>
+            <a:r>
+              <a:rPr lang="en-US" dirty="0" err="1"/>
+              <a:t>các</a:t>
+            </a:r>
+            <a:r>
+              <a:rPr lang="en-US" dirty="0"/>
+              <a:t> </a:t>
+            </a:r>
+            <a:r>
+              <a:rPr lang="en-US" dirty="0" err="1"/>
+              <a:t>bài</a:t>
+            </a:r>
+            <a:r>
+              <a:rPr lang="en-US" dirty="0"/>
+              <a:t> </a:t>
+            </a:r>
+            <a:r>
+              <a:rPr lang="en-US" dirty="0" err="1"/>
+              <a:t>báo</a:t>
+            </a:r>
+            <a:r>
+              <a:rPr lang="en-US" dirty="0"/>
+              <a:t> </a:t>
+            </a:r>
+            <a:r>
+              <a:rPr lang="en-US" dirty="0" err="1"/>
+              <a:t>thu</a:t>
+            </a:r>
+            <a:r>
+              <a:rPr lang="en-US" dirty="0"/>
+              <a:t> </a:t>
+            </a:r>
+            <a:r>
+              <a:rPr lang="en-US" dirty="0" err="1"/>
+              <a:t>thập</a:t>
+            </a:r>
+            <a:r>
+              <a:rPr lang="en-US" dirty="0"/>
+              <a:t> ở </a:t>
+            </a:r>
+            <a:r>
+              <a:rPr lang="en-US" dirty="0" err="1"/>
+              <a:t>một</a:t>
+            </a:r>
+            <a:r>
+              <a:rPr lang="en-US" dirty="0"/>
+              <a:t> </a:t>
+            </a:r>
+            <a:r>
+              <a:rPr lang="en-US" dirty="0" err="1"/>
+              <a:t>trang</a:t>
+            </a:r>
+            <a:r>
+              <a:rPr lang="en-US" dirty="0"/>
+              <a:t> </a:t>
+            </a:r>
+            <a:r>
+              <a:rPr lang="en-US" dirty="0" err="1"/>
+              <a:t>khác</a:t>
+            </a:r>
+            <a:r>
+              <a:rPr lang="en-US" dirty="0"/>
+              <a:t> (</a:t>
+            </a:r>
+            <a:r>
+              <a:rPr lang="en-SG" b="0" i="0" u="sng" dirty="0">
+                <a:solidFill>
+                  <a:srgbClr val="1A466C"/>
+                </a:solidFill>
+                <a:effectLst/>
+                <a:latin typeface="Helvetica Neue"/>
+                <a:hlinkClick r:id="rId2"/>
+              </a:rPr>
+              <a:t>https://vietnamnet.vn/</a:t>
+            </a:r>
+            <a:r>
+              <a:rPr lang="en-US" dirty="0"/>
+              <a:t>) </a:t>
+            </a:r>
+            <a:r>
+              <a:rPr lang="en-US" dirty="0" err="1"/>
+              <a:t>thì</a:t>
+            </a:r>
+            <a:r>
+              <a:rPr lang="en-US" dirty="0"/>
+              <a:t> </a:t>
+            </a:r>
+            <a:r>
+              <a:rPr lang="en-US" dirty="0" err="1"/>
+              <a:t>cho</a:t>
+            </a:r>
+            <a:r>
+              <a:rPr lang="en-US" dirty="0"/>
+              <a:t> </a:t>
+            </a:r>
+            <a:r>
+              <a:rPr lang="en-US" dirty="0" err="1"/>
+              <a:t>kết</a:t>
+            </a:r>
+            <a:r>
+              <a:rPr lang="en-US" dirty="0"/>
+              <a:t> </a:t>
+            </a:r>
+            <a:r>
+              <a:rPr lang="en-US" dirty="0" err="1"/>
+              <a:t>quả</a:t>
+            </a:r>
+            <a:r>
+              <a:rPr lang="en-US" dirty="0"/>
+              <a:t> </a:t>
+            </a:r>
+            <a:r>
+              <a:rPr lang="en-US" dirty="0" err="1"/>
+              <a:t>thấp</a:t>
+            </a:r>
+            <a:r>
+              <a:rPr lang="en-US" dirty="0"/>
+              <a:t> </a:t>
+            </a:r>
+            <a:r>
+              <a:rPr lang="en-US" dirty="0" err="1"/>
+              <a:t>hơn</a:t>
+            </a:r>
+            <a:r>
+              <a:rPr lang="en-US" dirty="0"/>
+              <a:t> </a:t>
+            </a:r>
+            <a:r>
+              <a:rPr lang="en-US" dirty="0" err="1"/>
+              <a:t>nhưng</a:t>
+            </a:r>
+            <a:r>
+              <a:rPr lang="en-US" dirty="0"/>
+              <a:t> </a:t>
+            </a:r>
+            <a:r>
+              <a:rPr lang="en-US" dirty="0" err="1"/>
+              <a:t>vẫn</a:t>
+            </a:r>
+            <a:r>
+              <a:rPr lang="en-US" dirty="0"/>
+              <a:t> ở </a:t>
+            </a:r>
+            <a:r>
+              <a:rPr lang="en-US" dirty="0" err="1"/>
+              <a:t>mức</a:t>
+            </a:r>
+            <a:r>
+              <a:rPr lang="en-US" dirty="0"/>
+              <a:t> </a:t>
+            </a:r>
+            <a:r>
+              <a:rPr lang="en-US" dirty="0" err="1"/>
+              <a:t>cao</a:t>
+            </a:r>
+            <a:r>
+              <a:rPr lang="en-US" dirty="0"/>
+              <a:t>.</a:t>
+            </a:r>
+          </a:p>
+          <a:p>
+            <a:endParaRPr lang="en-SG" dirty="0"/>
+          </a:p>
+        </p:txBody>
+      </p:sp>
+      <p:sp>
+        <p:nvSpPr>
+          <p:cNvPr id="4" name="Chỗ dành sẵn cho Số hiệu Bản chiếu 3">
+            <a:extLst>
+              <a:ext uri="{FF2B5EF4-FFF2-40B4-BE49-F238E27FC236}">
+                <a16:creationId xmlns:a16="http://schemas.microsoft.com/office/drawing/2014/main" id="{655F4DB4-AA1E-4296-93B1-199DF05D19D0}"/>
+              </a:ext>
+            </a:extLst>
+          </p:cNvPr>
+          <p:cNvSpPr>
+            <a:spLocks noGrp="1"/>
+          </p:cNvSpPr>
+          <p:nvPr>
+            <p:ph type="sldNum" idx="12"/>
+          </p:nvPr>
+        </p:nvSpPr>
+        <p:spPr/>
+        <p:txBody>
+          <a:bodyPr/>
+          <a:lstStyle/>
+          <a:p>
+            <a:pPr marL="0" lvl="0" indent="0" algn="r" rtl="0">
+              <a:spcBef>
+                <a:spcPts val="0"/>
+              </a:spcBef>
+              <a:spcAft>
+                <a:spcPts val="0"/>
+              </a:spcAft>
+              <a:buNone/>
+            </a:pPr>
+            <a:fld id="{00000000-1234-1234-1234-123412341234}" type="slidenum">
+              <a:rPr lang="en" smtClean="0"/>
+              <a:t>21</a:t>
+            </a:fld>
+            <a:endParaRPr lang="en"/>
+          </a:p>
+        </p:txBody>
+      </p:sp>
+    </p:spTree>
+    <p:extLst>
+      <p:ext uri="{BB962C8B-B14F-4D97-AF65-F5344CB8AC3E}">
+        <p14:creationId xmlns:p14="http://schemas.microsoft.com/office/powerpoint/2010/main" val="2699200848"/>
+      </p:ext>
+    </p:extLst>
+  </p:cSld>
+  <p:clrMapOvr>
+    <a:masterClrMapping/>
+  </p:clrMapOvr>
+</p:sld>
+</file>
+
+<file path=ppt/slides/slide22.xml><?xml version="1.0" encoding="utf-8"?>
+<p:sld xmlns:a="http://schemas.openxmlformats.org/drawingml/2006/main" xmlns:r="http://schemas.openxmlformats.org/officeDocument/2006/relationships" xmlns:p="http://schemas.openxmlformats.org/presentationml/2006/main">
+  <p:cSld>
+    <p:spTree>
+      <p:nvGrpSpPr>
+        <p:cNvPr id="1" name=""/>
+        <p:cNvGrpSpPr/>
+        <p:nvPr/>
+      </p:nvGrpSpPr>
+      <p:grpSpPr>
+        <a:xfrm>
+          <a:off x="0" y="0"/>
+          <a:ext cx="0" cy="0"/>
+          <a:chOff x="0" y="0"/>
+          <a:chExt cx="0" cy="0"/>
+        </a:xfrm>
+      </p:grpSpPr>
+      <p:sp>
+        <p:nvSpPr>
+          <p:cNvPr id="2" name="Tiêu đề 1">
+            <a:extLst>
+              <a:ext uri="{FF2B5EF4-FFF2-40B4-BE49-F238E27FC236}">
                 <a16:creationId xmlns:a16="http://schemas.microsoft.com/office/drawing/2014/main" id="{E7AFFA20-B009-4F3F-AECA-9222C79902F6}"/>
               </a:ext>
             </a:extLst>
@@ -44144,7 +44835,7 @@
             </a:pPr>
             <a:fld id="{00000000-1234-1234-1234-123412341234}" type="slidenum">
               <a:rPr lang="en" smtClean="0"/>
-              <a:t>21</a:t>
+              <a:t>22</a:t>
             </a:fld>
             <a:endParaRPr lang="en"/>
           </a:p>
@@ -44163,7 +44854,7 @@
 </p:sld>
 </file>
 
-<file path=ppt/slides/slide22.xml><?xml version="1.0" encoding="utf-8"?>
+<file path=ppt/slides/slide23.xml><?xml version="1.0" encoding="utf-8"?>
 <p:sld xmlns:a="http://schemas.openxmlformats.org/drawingml/2006/main" xmlns:r="http://schemas.openxmlformats.org/officeDocument/2006/relationships" xmlns:p="http://schemas.openxmlformats.org/presentationml/2006/main">
   <p:cSld>
     <p:spTree>
@@ -44336,7 +45027,7 @@
             </a:pPr>
             <a:fld id="{00000000-1234-1234-1234-123412341234}" type="slidenum">
               <a:rPr lang="en" smtClean="0"/>
-              <a:t>22</a:t>
+              <a:t>23</a:t>
             </a:fld>
             <a:endParaRPr lang="en"/>
           </a:p>
@@ -44355,7 +45046,7 @@
 </p:sld>
 </file>
 
-<file path=ppt/slides/slide23.xml><?xml version="1.0" encoding="utf-8"?>
+<file path=ppt/slides/slide24.xml><?xml version="1.0" encoding="utf-8"?>
 <p:sld xmlns:a="http://schemas.openxmlformats.org/drawingml/2006/main" xmlns:r="http://schemas.openxmlformats.org/officeDocument/2006/relationships" xmlns:p="http://schemas.openxmlformats.org/presentationml/2006/main">
   <p:cSld>
     <p:spTree>
@@ -44418,567 +45109,6 @@
     <p:extLst>
       <p:ext uri="{BB962C8B-B14F-4D97-AF65-F5344CB8AC3E}">
         <p14:creationId xmlns:p14="http://schemas.microsoft.com/office/powerpoint/2010/main" val="4198722370"/>
-      </p:ext>
-    </p:extLst>
-  </p:cSld>
-  <p:clrMapOvr>
-    <a:masterClrMapping/>
-  </p:clrMapOvr>
-</p:sld>
-</file>
-
-<file path=ppt/slides/slide24.xml><?xml version="1.0" encoding="utf-8"?>
-<p:sld xmlns:a="http://schemas.openxmlformats.org/drawingml/2006/main" xmlns:r="http://schemas.openxmlformats.org/officeDocument/2006/relationships" xmlns:p="http://schemas.openxmlformats.org/presentationml/2006/main">
-  <p:cSld>
-    <p:spTree>
-      <p:nvGrpSpPr>
-        <p:cNvPr id="1" name=""/>
-        <p:cNvGrpSpPr/>
-        <p:nvPr/>
-      </p:nvGrpSpPr>
-      <p:grpSpPr>
-        <a:xfrm>
-          <a:off x="0" y="0"/>
-          <a:ext cx="0" cy="0"/>
-          <a:chOff x="0" y="0"/>
-          <a:chExt cx="0" cy="0"/>
-        </a:xfrm>
-      </p:grpSpPr>
-      <p:sp>
-        <p:nvSpPr>
-          <p:cNvPr id="2" name="Tiêu đề 1">
-            <a:extLst>
-              <a:ext uri="{FF2B5EF4-FFF2-40B4-BE49-F238E27FC236}">
-                <a16:creationId xmlns:a16="http://schemas.microsoft.com/office/drawing/2014/main" id="{AD23B9EE-178D-424D-840D-158D9521FDEF}"/>
-              </a:ext>
-            </a:extLst>
-          </p:cNvPr>
-          <p:cNvSpPr>
-            <a:spLocks noGrp="1"/>
-          </p:cNvSpPr>
-          <p:nvPr>
-            <p:ph type="title"/>
-          </p:nvPr>
-        </p:nvSpPr>
-        <p:spPr/>
-        <p:txBody>
-          <a:bodyPr/>
-          <a:lstStyle/>
-          <a:p>
-            <a:r>
-              <a:rPr lang="en-US" sz="2800" b="1" dirty="0" err="1"/>
-              <a:t>Quá</a:t>
-            </a:r>
-            <a:r>
-              <a:rPr lang="en-US" sz="2800" b="1" dirty="0"/>
-              <a:t> </a:t>
-            </a:r>
-            <a:r>
-              <a:rPr lang="en-US" sz="2800" b="1" dirty="0" err="1"/>
-              <a:t>trình</a:t>
-            </a:r>
-            <a:r>
-              <a:rPr lang="en-US" sz="2800" b="1" dirty="0"/>
-              <a:t> </a:t>
-            </a:r>
-            <a:r>
-              <a:rPr lang="en-US" sz="2800" b="1" dirty="0" err="1"/>
-              <a:t>làm</a:t>
-            </a:r>
-            <a:r>
-              <a:rPr lang="en-US" sz="2800" b="1" dirty="0"/>
-              <a:t> </a:t>
-            </a:r>
-            <a:r>
-              <a:rPr lang="en-US" sz="2800" b="1" dirty="0" err="1"/>
-              <a:t>đồ</a:t>
-            </a:r>
-            <a:r>
-              <a:rPr lang="en-US" sz="2800" b="1" dirty="0"/>
-              <a:t> </a:t>
-            </a:r>
-            <a:r>
-              <a:rPr lang="en-US" sz="2800" b="1" dirty="0" err="1"/>
-              <a:t>án</a:t>
-            </a:r>
-            <a:endParaRPr lang="en-SG" sz="2800" b="1" dirty="0"/>
-          </a:p>
-        </p:txBody>
-      </p:sp>
-      <p:sp>
-        <p:nvSpPr>
-          <p:cNvPr id="3" name="Chỗ dành sẵn cho Văn bản 2">
-            <a:extLst>
-              <a:ext uri="{FF2B5EF4-FFF2-40B4-BE49-F238E27FC236}">
-                <a16:creationId xmlns:a16="http://schemas.microsoft.com/office/drawing/2014/main" id="{88BB54A9-2AE1-4A08-9738-1C43520DB54A}"/>
-              </a:ext>
-            </a:extLst>
-          </p:cNvPr>
-          <p:cNvSpPr>
-            <a:spLocks noGrp="1"/>
-          </p:cNvSpPr>
-          <p:nvPr>
-            <p:ph type="body" idx="1"/>
-          </p:nvPr>
-        </p:nvSpPr>
-        <p:spPr>
-          <a:xfrm>
-            <a:off x="2825684" y="938100"/>
-            <a:ext cx="5292300" cy="3267300"/>
-          </a:xfrm>
-        </p:spPr>
-        <p:txBody>
-          <a:bodyPr/>
-          <a:lstStyle/>
-          <a:p>
-            <a:r>
-              <a:rPr lang="en-US" dirty="0" err="1"/>
-              <a:t>Điều</a:t>
-            </a:r>
-            <a:r>
-              <a:rPr lang="en-US" dirty="0"/>
-              <a:t> </a:t>
-            </a:r>
-            <a:r>
-              <a:rPr lang="en-US" dirty="0" err="1"/>
-              <a:t>học</a:t>
-            </a:r>
-            <a:r>
-              <a:rPr lang="en-US" dirty="0"/>
-              <a:t> </a:t>
-            </a:r>
-            <a:r>
-              <a:rPr lang="en-US" dirty="0" err="1"/>
-              <a:t>được</a:t>
-            </a:r>
-            <a:r>
-              <a:rPr lang="en-US" dirty="0"/>
-              <a:t> qua </a:t>
-            </a:r>
-            <a:r>
-              <a:rPr lang="en-US" dirty="0" err="1"/>
-              <a:t>đồ</a:t>
-            </a:r>
-            <a:r>
-              <a:rPr lang="en-US" dirty="0"/>
-              <a:t> </a:t>
-            </a:r>
-            <a:r>
-              <a:rPr lang="en-US" dirty="0" err="1"/>
-              <a:t>án</a:t>
-            </a:r>
-            <a:r>
-              <a:rPr lang="en-US" dirty="0"/>
-              <a:t> </a:t>
-            </a:r>
-            <a:r>
-              <a:rPr lang="en-US" dirty="0" err="1"/>
-              <a:t>này</a:t>
-            </a:r>
-            <a:r>
-              <a:rPr lang="en-US" dirty="0"/>
-              <a:t>:</a:t>
-            </a:r>
-          </a:p>
-          <a:p>
-            <a:pPr>
-              <a:buFont typeface="Wingdings" panose="05000000000000000000" pitchFamily="2" charset="2"/>
-              <a:buChar char="ü"/>
-            </a:pPr>
-            <a:r>
-              <a:rPr lang="en-US" dirty="0" err="1"/>
-              <a:t>Tự</a:t>
-            </a:r>
-            <a:r>
-              <a:rPr lang="en-US" dirty="0"/>
-              <a:t> </a:t>
-            </a:r>
-            <a:r>
-              <a:rPr lang="en-US" dirty="0" err="1"/>
-              <a:t>đặt</a:t>
-            </a:r>
-            <a:r>
-              <a:rPr lang="en-US" dirty="0"/>
-              <a:t> </a:t>
-            </a:r>
-            <a:r>
-              <a:rPr lang="en-US" dirty="0" err="1"/>
-              <a:t>và</a:t>
-            </a:r>
-            <a:r>
-              <a:rPr lang="en-US" dirty="0"/>
-              <a:t> </a:t>
-            </a:r>
-            <a:r>
-              <a:rPr lang="en-US" dirty="0" err="1"/>
-              <a:t>tìm</a:t>
-            </a:r>
-            <a:r>
-              <a:rPr lang="en-US" dirty="0"/>
-              <a:t> ra </a:t>
-            </a:r>
-            <a:r>
-              <a:rPr lang="en-US" dirty="0" err="1"/>
-              <a:t>các</a:t>
-            </a:r>
-            <a:r>
-              <a:rPr lang="en-US" dirty="0"/>
-              <a:t> </a:t>
-            </a:r>
-            <a:r>
-              <a:rPr lang="en-US" dirty="0" err="1"/>
-              <a:t>phương</a:t>
-            </a:r>
-            <a:r>
-              <a:rPr lang="en-US" dirty="0"/>
-              <a:t> </a:t>
-            </a:r>
-            <a:r>
-              <a:rPr lang="en-US" dirty="0" err="1"/>
-              <a:t>pháp</a:t>
-            </a:r>
-            <a:r>
-              <a:rPr lang="en-US" dirty="0"/>
-              <a:t> </a:t>
-            </a:r>
-            <a:r>
-              <a:rPr lang="en-US" dirty="0" err="1"/>
-              <a:t>để</a:t>
-            </a:r>
-            <a:r>
-              <a:rPr lang="en-US" dirty="0"/>
-              <a:t> </a:t>
-            </a:r>
-            <a:r>
-              <a:rPr lang="en-US" dirty="0" err="1"/>
-              <a:t>có</a:t>
-            </a:r>
-            <a:r>
-              <a:rPr lang="en-US" dirty="0"/>
-              <a:t> </a:t>
-            </a:r>
-            <a:r>
-              <a:rPr lang="en-US" dirty="0" err="1"/>
-              <a:t>thể</a:t>
-            </a:r>
-            <a:r>
-              <a:rPr lang="en-US" dirty="0"/>
-              <a:t> </a:t>
-            </a:r>
-            <a:r>
-              <a:rPr lang="en-US" dirty="0" err="1"/>
-              <a:t>giải</a:t>
-            </a:r>
-            <a:r>
-              <a:rPr lang="en-US" dirty="0"/>
-              <a:t> </a:t>
-            </a:r>
-            <a:r>
-              <a:rPr lang="en-US" dirty="0" err="1"/>
-              <a:t>quyết</a:t>
-            </a:r>
-            <a:r>
-              <a:rPr lang="en-US" dirty="0"/>
-              <a:t> </a:t>
-            </a:r>
-            <a:r>
-              <a:rPr lang="en-US" dirty="0" err="1"/>
-              <a:t>vấn</a:t>
-            </a:r>
-            <a:r>
-              <a:rPr lang="en-US" dirty="0"/>
-              <a:t> </a:t>
-            </a:r>
-            <a:r>
-              <a:rPr lang="en-US" dirty="0" err="1"/>
-              <a:t>đề</a:t>
-            </a:r>
-            <a:r>
-              <a:rPr lang="en-US" dirty="0"/>
-              <a:t> </a:t>
-            </a:r>
-            <a:r>
-              <a:rPr lang="en-US" dirty="0" err="1"/>
-              <a:t>một</a:t>
-            </a:r>
-            <a:r>
-              <a:rPr lang="en-US" dirty="0"/>
-              <a:t> </a:t>
-            </a:r>
-            <a:r>
-              <a:rPr lang="en-US" dirty="0" err="1"/>
-              <a:t>cách</a:t>
-            </a:r>
-            <a:r>
-              <a:rPr lang="en-US" dirty="0"/>
-              <a:t> </a:t>
-            </a:r>
-            <a:r>
-              <a:rPr lang="en-US" dirty="0" err="1"/>
-              <a:t>tốt</a:t>
-            </a:r>
-            <a:r>
-              <a:rPr lang="en-US" dirty="0"/>
-              <a:t>, </a:t>
-            </a:r>
-            <a:r>
-              <a:rPr lang="en-US" dirty="0" err="1"/>
-              <a:t>hiệu</a:t>
-            </a:r>
-            <a:r>
-              <a:rPr lang="en-US" dirty="0"/>
-              <a:t> </a:t>
-            </a:r>
-            <a:r>
-              <a:rPr lang="en-US" dirty="0" err="1"/>
-              <a:t>quả</a:t>
-            </a:r>
-            <a:r>
-              <a:rPr lang="en-US" dirty="0"/>
-              <a:t> </a:t>
-            </a:r>
-            <a:r>
-              <a:rPr lang="en-US" dirty="0" err="1"/>
-              <a:t>nhất</a:t>
-            </a:r>
-            <a:r>
-              <a:rPr lang="en-US" dirty="0"/>
-              <a:t>. </a:t>
-            </a:r>
-          </a:p>
-          <a:p>
-            <a:pPr>
-              <a:buFont typeface="Wingdings" panose="05000000000000000000" pitchFamily="2" charset="2"/>
-              <a:buChar char="ü"/>
-            </a:pPr>
-            <a:r>
-              <a:rPr lang="en-US" dirty="0" err="1"/>
-              <a:t>Cách</a:t>
-            </a:r>
-            <a:r>
-              <a:rPr lang="en-US" dirty="0"/>
-              <a:t> </a:t>
-            </a:r>
-            <a:r>
-              <a:rPr lang="en-US" dirty="0" err="1"/>
-              <a:t>thu</a:t>
-            </a:r>
-            <a:r>
-              <a:rPr lang="en-US" dirty="0"/>
-              <a:t> </a:t>
-            </a:r>
-            <a:r>
-              <a:rPr lang="en-US" dirty="0" err="1"/>
-              <a:t>thập</a:t>
-            </a:r>
-            <a:r>
-              <a:rPr lang="en-US" dirty="0"/>
-              <a:t> </a:t>
-            </a:r>
-            <a:r>
-              <a:rPr lang="en-US" dirty="0" err="1"/>
-              <a:t>dữ</a:t>
-            </a:r>
-            <a:r>
-              <a:rPr lang="en-US" dirty="0"/>
-              <a:t> </a:t>
-            </a:r>
-            <a:r>
-              <a:rPr lang="en-US" dirty="0" err="1"/>
-              <a:t>liệu</a:t>
-            </a:r>
-            <a:r>
-              <a:rPr lang="en-US" dirty="0"/>
-              <a:t> </a:t>
-            </a:r>
-            <a:r>
-              <a:rPr lang="en-US" dirty="0" err="1"/>
-              <a:t>từ</a:t>
-            </a:r>
-            <a:r>
-              <a:rPr lang="en-US" dirty="0"/>
-              <a:t> </a:t>
-            </a:r>
-            <a:r>
-              <a:rPr lang="en-US" dirty="0" err="1"/>
-              <a:t>trang</a:t>
-            </a:r>
-            <a:r>
-              <a:rPr lang="en-US" dirty="0"/>
-              <a:t> web.</a:t>
-            </a:r>
-          </a:p>
-          <a:p>
-            <a:pPr>
-              <a:buFont typeface="Wingdings" panose="05000000000000000000" pitchFamily="2" charset="2"/>
-              <a:buChar char="ü"/>
-            </a:pPr>
-            <a:r>
-              <a:rPr lang="en-US" dirty="0" err="1"/>
-              <a:t>Lựa</a:t>
-            </a:r>
-            <a:r>
-              <a:rPr lang="en-US" dirty="0"/>
-              <a:t> </a:t>
-            </a:r>
-            <a:r>
-              <a:rPr lang="en-US" dirty="0" err="1"/>
-              <a:t>chọn</a:t>
-            </a:r>
-            <a:r>
-              <a:rPr lang="en-US" dirty="0"/>
-              <a:t> </a:t>
-            </a:r>
-            <a:r>
-              <a:rPr lang="en-US" dirty="0" err="1"/>
-              <a:t>và</a:t>
-            </a:r>
-            <a:r>
-              <a:rPr lang="en-US" dirty="0"/>
-              <a:t> </a:t>
-            </a:r>
-            <a:r>
-              <a:rPr lang="en-US" dirty="0" err="1"/>
-              <a:t>huấn</a:t>
-            </a:r>
-            <a:r>
-              <a:rPr lang="en-US" dirty="0"/>
-              <a:t> </a:t>
-            </a:r>
-            <a:r>
-              <a:rPr lang="en-US" dirty="0" err="1"/>
-              <a:t>luyện</a:t>
-            </a:r>
-            <a:r>
-              <a:rPr lang="en-US" dirty="0"/>
-              <a:t> </a:t>
-            </a:r>
-            <a:r>
-              <a:rPr lang="en-US" dirty="0" err="1"/>
-              <a:t>một</a:t>
-            </a:r>
-            <a:r>
-              <a:rPr lang="en-US" dirty="0"/>
-              <a:t> </a:t>
-            </a:r>
-            <a:r>
-              <a:rPr lang="en-US" dirty="0" err="1"/>
-              <a:t>mô</a:t>
-            </a:r>
-            <a:r>
-              <a:rPr lang="en-US" dirty="0"/>
-              <a:t> </a:t>
-            </a:r>
-            <a:r>
-              <a:rPr lang="en-US" dirty="0" err="1"/>
-              <a:t>hình</a:t>
-            </a:r>
-            <a:r>
-              <a:rPr lang="en-US" dirty="0"/>
-              <a:t>.</a:t>
-            </a:r>
-          </a:p>
-          <a:p>
-            <a:pPr>
-              <a:buFont typeface="Wingdings" panose="05000000000000000000" pitchFamily="2" charset="2"/>
-              <a:buChar char="ü"/>
-            </a:pPr>
-            <a:r>
-              <a:rPr lang="en-US" dirty="0" err="1"/>
-              <a:t>Cách</a:t>
-            </a:r>
-            <a:r>
-              <a:rPr lang="en-US" dirty="0"/>
-              <a:t> </a:t>
-            </a:r>
-            <a:r>
-              <a:rPr lang="en-US" dirty="0" err="1"/>
-              <a:t>làm</a:t>
-            </a:r>
-            <a:r>
-              <a:rPr lang="en-US" dirty="0"/>
-              <a:t> </a:t>
-            </a:r>
-            <a:r>
-              <a:rPr lang="en-US" dirty="0" err="1"/>
-              <a:t>việc</a:t>
-            </a:r>
-            <a:r>
-              <a:rPr lang="en-US" dirty="0"/>
-              <a:t> </a:t>
-            </a:r>
-            <a:r>
-              <a:rPr lang="en-US" dirty="0" err="1"/>
-              <a:t>nhóm</a:t>
-            </a:r>
-            <a:r>
-              <a:rPr lang="en-US" dirty="0"/>
-              <a:t> </a:t>
-            </a:r>
-            <a:r>
-              <a:rPr lang="en-US" dirty="0" err="1"/>
-              <a:t>hiệu</a:t>
-            </a:r>
-            <a:r>
-              <a:rPr lang="en-US" dirty="0"/>
-              <a:t> </a:t>
-            </a:r>
-            <a:r>
-              <a:rPr lang="en-US" dirty="0" err="1"/>
-              <a:t>quả</a:t>
-            </a:r>
-            <a:r>
-              <a:rPr lang="en-US" dirty="0"/>
-              <a:t>.</a:t>
-            </a:r>
-          </a:p>
-          <a:p>
-            <a:endParaRPr lang="en-US" dirty="0"/>
-          </a:p>
-        </p:txBody>
-      </p:sp>
-      <p:sp>
-        <p:nvSpPr>
-          <p:cNvPr id="4" name="Chỗ dành sẵn cho Số hiệu Bản chiếu 3">
-            <a:extLst>
-              <a:ext uri="{FF2B5EF4-FFF2-40B4-BE49-F238E27FC236}">
-                <a16:creationId xmlns:a16="http://schemas.microsoft.com/office/drawing/2014/main" id="{4A3EC514-F859-4CC6-A41E-11EE6A0100DE}"/>
-              </a:ext>
-            </a:extLst>
-          </p:cNvPr>
-          <p:cNvSpPr>
-            <a:spLocks noGrp="1"/>
-          </p:cNvSpPr>
-          <p:nvPr>
-            <p:ph type="sldNum" idx="12"/>
-          </p:nvPr>
-        </p:nvSpPr>
-        <p:spPr/>
-        <p:txBody>
-          <a:bodyPr/>
-          <a:lstStyle/>
-          <a:p>
-            <a:pPr marL="0" lvl="0" indent="0" algn="r" rtl="0">
-              <a:spcBef>
-                <a:spcPts val="0"/>
-              </a:spcBef>
-              <a:spcAft>
-                <a:spcPts val="0"/>
-              </a:spcAft>
-              <a:buNone/>
-            </a:pPr>
-            <a:fld id="{00000000-1234-1234-1234-123412341234}" type="slidenum">
-              <a:rPr lang="en" smtClean="0"/>
-              <a:t>24</a:t>
-            </a:fld>
-            <a:endParaRPr lang="en"/>
-          </a:p>
-        </p:txBody>
-      </p:sp>
-    </p:spTree>
-    <p:extLst>
-      <p:ext uri="{BB962C8B-B14F-4D97-AF65-F5344CB8AC3E}">
-        <p14:creationId xmlns:p14="http://schemas.microsoft.com/office/powerpoint/2010/main" val="4132649367"/>
       </p:ext>
     </p:extLst>
   </p:cSld>
@@ -45084,6 +45214,567 @@
         </p:nvSpPr>
         <p:spPr>
           <a:xfrm>
+            <a:off x="2825684" y="938100"/>
+            <a:ext cx="5292300" cy="3267300"/>
+          </a:xfrm>
+        </p:spPr>
+        <p:txBody>
+          <a:bodyPr/>
+          <a:lstStyle/>
+          <a:p>
+            <a:r>
+              <a:rPr lang="en-US" dirty="0" err="1"/>
+              <a:t>Điều</a:t>
+            </a:r>
+            <a:r>
+              <a:rPr lang="en-US" dirty="0"/>
+              <a:t> </a:t>
+            </a:r>
+            <a:r>
+              <a:rPr lang="en-US" dirty="0" err="1"/>
+              <a:t>học</a:t>
+            </a:r>
+            <a:r>
+              <a:rPr lang="en-US" dirty="0"/>
+              <a:t> </a:t>
+            </a:r>
+            <a:r>
+              <a:rPr lang="en-US" dirty="0" err="1"/>
+              <a:t>được</a:t>
+            </a:r>
+            <a:r>
+              <a:rPr lang="en-US" dirty="0"/>
+              <a:t> qua </a:t>
+            </a:r>
+            <a:r>
+              <a:rPr lang="en-US" dirty="0" err="1"/>
+              <a:t>đồ</a:t>
+            </a:r>
+            <a:r>
+              <a:rPr lang="en-US" dirty="0"/>
+              <a:t> </a:t>
+            </a:r>
+            <a:r>
+              <a:rPr lang="en-US" dirty="0" err="1"/>
+              <a:t>án</a:t>
+            </a:r>
+            <a:r>
+              <a:rPr lang="en-US" dirty="0"/>
+              <a:t> </a:t>
+            </a:r>
+            <a:r>
+              <a:rPr lang="en-US" dirty="0" err="1"/>
+              <a:t>này</a:t>
+            </a:r>
+            <a:r>
+              <a:rPr lang="en-US" dirty="0"/>
+              <a:t>:</a:t>
+            </a:r>
+          </a:p>
+          <a:p>
+            <a:pPr>
+              <a:buFont typeface="Wingdings" panose="05000000000000000000" pitchFamily="2" charset="2"/>
+              <a:buChar char="ü"/>
+            </a:pPr>
+            <a:r>
+              <a:rPr lang="en-US" dirty="0" err="1"/>
+              <a:t>Tự</a:t>
+            </a:r>
+            <a:r>
+              <a:rPr lang="en-US" dirty="0"/>
+              <a:t> </a:t>
+            </a:r>
+            <a:r>
+              <a:rPr lang="en-US" dirty="0" err="1"/>
+              <a:t>đặt</a:t>
+            </a:r>
+            <a:r>
+              <a:rPr lang="en-US" dirty="0"/>
+              <a:t> </a:t>
+            </a:r>
+            <a:r>
+              <a:rPr lang="en-US" dirty="0" err="1"/>
+              <a:t>và</a:t>
+            </a:r>
+            <a:r>
+              <a:rPr lang="en-US" dirty="0"/>
+              <a:t> </a:t>
+            </a:r>
+            <a:r>
+              <a:rPr lang="en-US" dirty="0" err="1"/>
+              <a:t>tìm</a:t>
+            </a:r>
+            <a:r>
+              <a:rPr lang="en-US" dirty="0"/>
+              <a:t> ra </a:t>
+            </a:r>
+            <a:r>
+              <a:rPr lang="en-US" dirty="0" err="1"/>
+              <a:t>các</a:t>
+            </a:r>
+            <a:r>
+              <a:rPr lang="en-US" dirty="0"/>
+              <a:t> </a:t>
+            </a:r>
+            <a:r>
+              <a:rPr lang="en-US" dirty="0" err="1"/>
+              <a:t>phương</a:t>
+            </a:r>
+            <a:r>
+              <a:rPr lang="en-US" dirty="0"/>
+              <a:t> </a:t>
+            </a:r>
+            <a:r>
+              <a:rPr lang="en-US" dirty="0" err="1"/>
+              <a:t>pháp</a:t>
+            </a:r>
+            <a:r>
+              <a:rPr lang="en-US" dirty="0"/>
+              <a:t> </a:t>
+            </a:r>
+            <a:r>
+              <a:rPr lang="en-US" dirty="0" err="1"/>
+              <a:t>để</a:t>
+            </a:r>
+            <a:r>
+              <a:rPr lang="en-US" dirty="0"/>
+              <a:t> </a:t>
+            </a:r>
+            <a:r>
+              <a:rPr lang="en-US" dirty="0" err="1"/>
+              <a:t>có</a:t>
+            </a:r>
+            <a:r>
+              <a:rPr lang="en-US" dirty="0"/>
+              <a:t> </a:t>
+            </a:r>
+            <a:r>
+              <a:rPr lang="en-US" dirty="0" err="1"/>
+              <a:t>thể</a:t>
+            </a:r>
+            <a:r>
+              <a:rPr lang="en-US" dirty="0"/>
+              <a:t> </a:t>
+            </a:r>
+            <a:r>
+              <a:rPr lang="en-US" dirty="0" err="1"/>
+              <a:t>giải</a:t>
+            </a:r>
+            <a:r>
+              <a:rPr lang="en-US" dirty="0"/>
+              <a:t> </a:t>
+            </a:r>
+            <a:r>
+              <a:rPr lang="en-US" dirty="0" err="1"/>
+              <a:t>quyết</a:t>
+            </a:r>
+            <a:r>
+              <a:rPr lang="en-US" dirty="0"/>
+              <a:t> </a:t>
+            </a:r>
+            <a:r>
+              <a:rPr lang="en-US" dirty="0" err="1"/>
+              <a:t>vấn</a:t>
+            </a:r>
+            <a:r>
+              <a:rPr lang="en-US" dirty="0"/>
+              <a:t> </a:t>
+            </a:r>
+            <a:r>
+              <a:rPr lang="en-US" dirty="0" err="1"/>
+              <a:t>đề</a:t>
+            </a:r>
+            <a:r>
+              <a:rPr lang="en-US" dirty="0"/>
+              <a:t> </a:t>
+            </a:r>
+            <a:r>
+              <a:rPr lang="en-US" dirty="0" err="1"/>
+              <a:t>một</a:t>
+            </a:r>
+            <a:r>
+              <a:rPr lang="en-US" dirty="0"/>
+              <a:t> </a:t>
+            </a:r>
+            <a:r>
+              <a:rPr lang="en-US" dirty="0" err="1"/>
+              <a:t>cách</a:t>
+            </a:r>
+            <a:r>
+              <a:rPr lang="en-US" dirty="0"/>
+              <a:t> </a:t>
+            </a:r>
+            <a:r>
+              <a:rPr lang="en-US" dirty="0" err="1"/>
+              <a:t>tốt</a:t>
+            </a:r>
+            <a:r>
+              <a:rPr lang="en-US" dirty="0"/>
+              <a:t>, </a:t>
+            </a:r>
+            <a:r>
+              <a:rPr lang="en-US" dirty="0" err="1"/>
+              <a:t>hiệu</a:t>
+            </a:r>
+            <a:r>
+              <a:rPr lang="en-US" dirty="0"/>
+              <a:t> </a:t>
+            </a:r>
+            <a:r>
+              <a:rPr lang="en-US" dirty="0" err="1"/>
+              <a:t>quả</a:t>
+            </a:r>
+            <a:r>
+              <a:rPr lang="en-US" dirty="0"/>
+              <a:t> </a:t>
+            </a:r>
+            <a:r>
+              <a:rPr lang="en-US" dirty="0" err="1"/>
+              <a:t>nhất</a:t>
+            </a:r>
+            <a:r>
+              <a:rPr lang="en-US" dirty="0"/>
+              <a:t>. </a:t>
+            </a:r>
+          </a:p>
+          <a:p>
+            <a:pPr>
+              <a:buFont typeface="Wingdings" panose="05000000000000000000" pitchFamily="2" charset="2"/>
+              <a:buChar char="ü"/>
+            </a:pPr>
+            <a:r>
+              <a:rPr lang="en-US" dirty="0" err="1"/>
+              <a:t>Cách</a:t>
+            </a:r>
+            <a:r>
+              <a:rPr lang="en-US" dirty="0"/>
+              <a:t> </a:t>
+            </a:r>
+            <a:r>
+              <a:rPr lang="en-US" dirty="0" err="1"/>
+              <a:t>thu</a:t>
+            </a:r>
+            <a:r>
+              <a:rPr lang="en-US" dirty="0"/>
+              <a:t> </a:t>
+            </a:r>
+            <a:r>
+              <a:rPr lang="en-US" dirty="0" err="1"/>
+              <a:t>thập</a:t>
+            </a:r>
+            <a:r>
+              <a:rPr lang="en-US" dirty="0"/>
+              <a:t> </a:t>
+            </a:r>
+            <a:r>
+              <a:rPr lang="en-US" dirty="0" err="1"/>
+              <a:t>dữ</a:t>
+            </a:r>
+            <a:r>
+              <a:rPr lang="en-US" dirty="0"/>
+              <a:t> </a:t>
+            </a:r>
+            <a:r>
+              <a:rPr lang="en-US" dirty="0" err="1"/>
+              <a:t>liệu</a:t>
+            </a:r>
+            <a:r>
+              <a:rPr lang="en-US" dirty="0"/>
+              <a:t> </a:t>
+            </a:r>
+            <a:r>
+              <a:rPr lang="en-US" dirty="0" err="1"/>
+              <a:t>từ</a:t>
+            </a:r>
+            <a:r>
+              <a:rPr lang="en-US" dirty="0"/>
+              <a:t> </a:t>
+            </a:r>
+            <a:r>
+              <a:rPr lang="en-US" dirty="0" err="1"/>
+              <a:t>trang</a:t>
+            </a:r>
+            <a:r>
+              <a:rPr lang="en-US" dirty="0"/>
+              <a:t> web.</a:t>
+            </a:r>
+          </a:p>
+          <a:p>
+            <a:pPr>
+              <a:buFont typeface="Wingdings" panose="05000000000000000000" pitchFamily="2" charset="2"/>
+              <a:buChar char="ü"/>
+            </a:pPr>
+            <a:r>
+              <a:rPr lang="en-US" dirty="0" err="1"/>
+              <a:t>Lựa</a:t>
+            </a:r>
+            <a:r>
+              <a:rPr lang="en-US" dirty="0"/>
+              <a:t> </a:t>
+            </a:r>
+            <a:r>
+              <a:rPr lang="en-US" dirty="0" err="1"/>
+              <a:t>chọn</a:t>
+            </a:r>
+            <a:r>
+              <a:rPr lang="en-US" dirty="0"/>
+              <a:t> </a:t>
+            </a:r>
+            <a:r>
+              <a:rPr lang="en-US" dirty="0" err="1"/>
+              <a:t>và</a:t>
+            </a:r>
+            <a:r>
+              <a:rPr lang="en-US" dirty="0"/>
+              <a:t> </a:t>
+            </a:r>
+            <a:r>
+              <a:rPr lang="en-US" dirty="0" err="1"/>
+              <a:t>huấn</a:t>
+            </a:r>
+            <a:r>
+              <a:rPr lang="en-US" dirty="0"/>
+              <a:t> </a:t>
+            </a:r>
+            <a:r>
+              <a:rPr lang="en-US" dirty="0" err="1"/>
+              <a:t>luyện</a:t>
+            </a:r>
+            <a:r>
+              <a:rPr lang="en-US" dirty="0"/>
+              <a:t> </a:t>
+            </a:r>
+            <a:r>
+              <a:rPr lang="en-US" dirty="0" err="1"/>
+              <a:t>một</a:t>
+            </a:r>
+            <a:r>
+              <a:rPr lang="en-US" dirty="0"/>
+              <a:t> </a:t>
+            </a:r>
+            <a:r>
+              <a:rPr lang="en-US" dirty="0" err="1"/>
+              <a:t>mô</a:t>
+            </a:r>
+            <a:r>
+              <a:rPr lang="en-US" dirty="0"/>
+              <a:t> </a:t>
+            </a:r>
+            <a:r>
+              <a:rPr lang="en-US" dirty="0" err="1"/>
+              <a:t>hình</a:t>
+            </a:r>
+            <a:r>
+              <a:rPr lang="en-US" dirty="0"/>
+              <a:t>.</a:t>
+            </a:r>
+          </a:p>
+          <a:p>
+            <a:pPr>
+              <a:buFont typeface="Wingdings" panose="05000000000000000000" pitchFamily="2" charset="2"/>
+              <a:buChar char="ü"/>
+            </a:pPr>
+            <a:r>
+              <a:rPr lang="en-US" dirty="0" err="1"/>
+              <a:t>Cách</a:t>
+            </a:r>
+            <a:r>
+              <a:rPr lang="en-US" dirty="0"/>
+              <a:t> </a:t>
+            </a:r>
+            <a:r>
+              <a:rPr lang="en-US" dirty="0" err="1"/>
+              <a:t>làm</a:t>
+            </a:r>
+            <a:r>
+              <a:rPr lang="en-US" dirty="0"/>
+              <a:t> </a:t>
+            </a:r>
+            <a:r>
+              <a:rPr lang="en-US" dirty="0" err="1"/>
+              <a:t>việc</a:t>
+            </a:r>
+            <a:r>
+              <a:rPr lang="en-US" dirty="0"/>
+              <a:t> </a:t>
+            </a:r>
+            <a:r>
+              <a:rPr lang="en-US" dirty="0" err="1"/>
+              <a:t>nhóm</a:t>
+            </a:r>
+            <a:r>
+              <a:rPr lang="en-US" dirty="0"/>
+              <a:t> </a:t>
+            </a:r>
+            <a:r>
+              <a:rPr lang="en-US" dirty="0" err="1"/>
+              <a:t>hiệu</a:t>
+            </a:r>
+            <a:r>
+              <a:rPr lang="en-US" dirty="0"/>
+              <a:t> </a:t>
+            </a:r>
+            <a:r>
+              <a:rPr lang="en-US" dirty="0" err="1"/>
+              <a:t>quả</a:t>
+            </a:r>
+            <a:r>
+              <a:rPr lang="en-US" dirty="0"/>
+              <a:t>.</a:t>
+            </a:r>
+          </a:p>
+          <a:p>
+            <a:endParaRPr lang="en-US" dirty="0"/>
+          </a:p>
+        </p:txBody>
+      </p:sp>
+      <p:sp>
+        <p:nvSpPr>
+          <p:cNvPr id="4" name="Chỗ dành sẵn cho Số hiệu Bản chiếu 3">
+            <a:extLst>
+              <a:ext uri="{FF2B5EF4-FFF2-40B4-BE49-F238E27FC236}">
+                <a16:creationId xmlns:a16="http://schemas.microsoft.com/office/drawing/2014/main" id="{4A3EC514-F859-4CC6-A41E-11EE6A0100DE}"/>
+              </a:ext>
+            </a:extLst>
+          </p:cNvPr>
+          <p:cNvSpPr>
+            <a:spLocks noGrp="1"/>
+          </p:cNvSpPr>
+          <p:nvPr>
+            <p:ph type="sldNum" idx="12"/>
+          </p:nvPr>
+        </p:nvSpPr>
+        <p:spPr/>
+        <p:txBody>
+          <a:bodyPr/>
+          <a:lstStyle/>
+          <a:p>
+            <a:pPr marL="0" lvl="0" indent="0" algn="r" rtl="0">
+              <a:spcBef>
+                <a:spcPts val="0"/>
+              </a:spcBef>
+              <a:spcAft>
+                <a:spcPts val="0"/>
+              </a:spcAft>
+              <a:buNone/>
+            </a:pPr>
+            <a:fld id="{00000000-1234-1234-1234-123412341234}" type="slidenum">
+              <a:rPr lang="en" smtClean="0"/>
+              <a:t>25</a:t>
+            </a:fld>
+            <a:endParaRPr lang="en"/>
+          </a:p>
+        </p:txBody>
+      </p:sp>
+    </p:spTree>
+    <p:extLst>
+      <p:ext uri="{BB962C8B-B14F-4D97-AF65-F5344CB8AC3E}">
+        <p14:creationId xmlns:p14="http://schemas.microsoft.com/office/powerpoint/2010/main" val="4132649367"/>
+      </p:ext>
+    </p:extLst>
+  </p:cSld>
+  <p:clrMapOvr>
+    <a:masterClrMapping/>
+  </p:clrMapOvr>
+</p:sld>
+</file>
+
+<file path=ppt/slides/slide26.xml><?xml version="1.0" encoding="utf-8"?>
+<p:sld xmlns:a="http://schemas.openxmlformats.org/drawingml/2006/main" xmlns:r="http://schemas.openxmlformats.org/officeDocument/2006/relationships" xmlns:p="http://schemas.openxmlformats.org/presentationml/2006/main">
+  <p:cSld>
+    <p:spTree>
+      <p:nvGrpSpPr>
+        <p:cNvPr id="1" name=""/>
+        <p:cNvGrpSpPr/>
+        <p:nvPr/>
+      </p:nvGrpSpPr>
+      <p:grpSpPr>
+        <a:xfrm>
+          <a:off x="0" y="0"/>
+          <a:ext cx="0" cy="0"/>
+          <a:chOff x="0" y="0"/>
+          <a:chExt cx="0" cy="0"/>
+        </a:xfrm>
+      </p:grpSpPr>
+      <p:sp>
+        <p:nvSpPr>
+          <p:cNvPr id="2" name="Tiêu đề 1">
+            <a:extLst>
+              <a:ext uri="{FF2B5EF4-FFF2-40B4-BE49-F238E27FC236}">
+                <a16:creationId xmlns:a16="http://schemas.microsoft.com/office/drawing/2014/main" id="{AD23B9EE-178D-424D-840D-158D9521FDEF}"/>
+              </a:ext>
+            </a:extLst>
+          </p:cNvPr>
+          <p:cNvSpPr>
+            <a:spLocks noGrp="1"/>
+          </p:cNvSpPr>
+          <p:nvPr>
+            <p:ph type="title"/>
+          </p:nvPr>
+        </p:nvSpPr>
+        <p:spPr/>
+        <p:txBody>
+          <a:bodyPr/>
+          <a:lstStyle/>
+          <a:p>
+            <a:r>
+              <a:rPr lang="en-US" sz="2800" b="1" dirty="0" err="1"/>
+              <a:t>Quá</a:t>
+            </a:r>
+            <a:r>
+              <a:rPr lang="en-US" sz="2800" b="1" dirty="0"/>
+              <a:t> </a:t>
+            </a:r>
+            <a:r>
+              <a:rPr lang="en-US" sz="2800" b="1" dirty="0" err="1"/>
+              <a:t>trình</a:t>
+            </a:r>
+            <a:r>
+              <a:rPr lang="en-US" sz="2800" b="1" dirty="0"/>
+              <a:t> </a:t>
+            </a:r>
+            <a:r>
+              <a:rPr lang="en-US" sz="2800" b="1" dirty="0" err="1"/>
+              <a:t>làm</a:t>
+            </a:r>
+            <a:r>
+              <a:rPr lang="en-US" sz="2800" b="1" dirty="0"/>
+              <a:t> </a:t>
+            </a:r>
+            <a:r>
+              <a:rPr lang="en-US" sz="2800" b="1" dirty="0" err="1"/>
+              <a:t>đồ</a:t>
+            </a:r>
+            <a:r>
+              <a:rPr lang="en-US" sz="2800" b="1" dirty="0"/>
+              <a:t> </a:t>
+            </a:r>
+            <a:r>
+              <a:rPr lang="en-US" sz="2800" b="1" dirty="0" err="1"/>
+              <a:t>án</a:t>
+            </a:r>
+            <a:endParaRPr lang="en-SG" sz="2800" b="1" dirty="0"/>
+          </a:p>
+        </p:txBody>
+      </p:sp>
+      <p:sp>
+        <p:nvSpPr>
+          <p:cNvPr id="3" name="Chỗ dành sẵn cho Văn bản 2">
+            <a:extLst>
+              <a:ext uri="{FF2B5EF4-FFF2-40B4-BE49-F238E27FC236}">
+                <a16:creationId xmlns:a16="http://schemas.microsoft.com/office/drawing/2014/main" id="{88BB54A9-2AE1-4A08-9738-1C43520DB54A}"/>
+              </a:ext>
+            </a:extLst>
+          </p:cNvPr>
+          <p:cNvSpPr>
+            <a:spLocks noGrp="1"/>
+          </p:cNvSpPr>
+          <p:nvPr>
+            <p:ph type="body" idx="1"/>
+          </p:nvPr>
+        </p:nvSpPr>
+        <p:spPr>
+          <a:xfrm>
             <a:off x="2761390" y="1345293"/>
             <a:ext cx="5292300" cy="3267300"/>
           </a:xfrm>
@@ -45415,7 +46106,7 @@
             </a:pPr>
             <a:fld id="{00000000-1234-1234-1234-123412341234}" type="slidenum">
               <a:rPr lang="en" smtClean="0"/>
-              <a:t>25</a:t>
+              <a:t>26</a:t>
             </a:fld>
             <a:endParaRPr lang="en"/>
           </a:p>
@@ -45434,7 +46125,7 @@
 </p:sld>
 </file>
 
-<file path=ppt/slides/slide26.xml><?xml version="1.0" encoding="utf-8"?>
+<file path=ppt/slides/slide27.xml><?xml version="1.0" encoding="utf-8"?>
 <p:sld xmlns:a="http://schemas.openxmlformats.org/drawingml/2006/main" xmlns:r="http://schemas.openxmlformats.org/officeDocument/2006/relationships" xmlns:p="http://schemas.openxmlformats.org/presentationml/2006/main">
   <p:cSld>
     <p:spTree>
@@ -45745,7 +46436,7 @@
             </a:pPr>
             <a:fld id="{00000000-1234-1234-1234-123412341234}" type="slidenum">
               <a:rPr lang="en" smtClean="0"/>
-              <a:t>26</a:t>
+              <a:t>27</a:t>
             </a:fld>
             <a:endParaRPr lang="en"/>
           </a:p>
@@ -46255,7 +46946,7 @@
 </p:sld>
 </file>
 
-<file path=ppt/slides/slide27.xml><?xml version="1.0" encoding="utf-8"?>
+<file path=ppt/slides/slide28.xml><?xml version="1.0" encoding="utf-8"?>
 <p:sld xmlns:a="http://schemas.openxmlformats.org/drawingml/2006/main" xmlns:r="http://schemas.openxmlformats.org/officeDocument/2006/relationships" xmlns:p="http://schemas.openxmlformats.org/presentationml/2006/main">
   <p:cSld>
     <p:spTree>
@@ -46373,7 +47064,7 @@
             </a:pPr>
             <a:fld id="{00000000-1234-1234-1234-123412341234}" type="slidenum">
               <a:rPr lang="en"/>
-              <a:t>27</a:t>
+              <a:t>28</a:t>
             </a:fld>
             <a:endParaRPr/>
           </a:p>

</xml_diff>

<commit_message>
Chỉnh sửa slide thuyết trình
</commit_message>
<xml_diff>
--- a/Slide_DoAnCuoiKy_NMKHDL.pptx
+++ b/Slide_DoAnCuoiKy_NMKHDL.pptx
@@ -44054,7 +44054,15 @@
             </a:r>
             <a:r>
               <a:rPr lang="en-US" dirty="0" err="1"/>
-              <a:t>lỗi</a:t>
+              <a:t>chính</a:t>
+            </a:r>
+            <a:r>
+              <a:rPr lang="en-US" dirty="0"/>
+              <a:t> </a:t>
+            </a:r>
+            <a:r>
+              <a:rPr lang="en-US" dirty="0" err="1"/>
+              <a:t>xác</a:t>
             </a:r>
             <a:r>
               <a:rPr lang="en-US" dirty="0"/>
@@ -44096,7 +44104,15 @@
             </a:r>
             <a:r>
               <a:rPr lang="en-US" dirty="0" err="1"/>
-              <a:t>lỗi</a:t>
+              <a:t>chính</a:t>
+            </a:r>
+            <a:r>
+              <a:rPr lang="en-US" dirty="0"/>
+              <a:t> </a:t>
+            </a:r>
+            <a:r>
+              <a:rPr lang="en-US" dirty="0" err="1"/>
+              <a:t>xác</a:t>
             </a:r>
             <a:r>
               <a:rPr lang="en-US" dirty="0"/>
@@ -44138,7 +44154,15 @@
             </a:r>
             <a:r>
               <a:rPr lang="en-US" dirty="0" err="1"/>
-              <a:t>lỗi</a:t>
+              <a:t>chính</a:t>
+            </a:r>
+            <a:r>
+              <a:rPr lang="en-US" dirty="0"/>
+              <a:t> </a:t>
+            </a:r>
+            <a:r>
+              <a:rPr lang="en-US" dirty="0" err="1"/>
+              <a:t>xác</a:t>
             </a:r>
             <a:r>
               <a:rPr lang="en-US" dirty="0"/>

</xml_diff>